<commit_message>
add new use case and update pptx
</commit_message>
<xml_diff>
--- a/docs/การพัฒนาระบบสารสนเทศสำหรับกองงานประปา.pptx
+++ b/docs/การพัฒนาระบบสารสนเทศสำหรับกองงานประปา.pptx
@@ -13,6 +13,7 @@
     <p:sldId id="261" r:id="rId7"/>
     <p:sldId id="262" r:id="rId8"/>
     <p:sldId id="263" r:id="rId9"/>
+    <p:sldId id="264" r:id="rId10"/>
   </p:sldIdLst>
   <p:sldSz cx="12192000" cy="6858000"/>
   <p:notesSz cx="6858000" cy="9144000"/>
@@ -111,6 +112,11 @@
       </a:defRPr>
     </a:lvl9pPr>
   </p:defaultTextStyle>
+  <p:extLst>
+    <p:ext uri="{EFAFB233-063F-42B5-8137-9DF3F51BA10A}">
+      <p15:sldGuideLst xmlns:p15="http://schemas.microsoft.com/office/powerpoint/2012/main"/>
+    </p:ext>
+  </p:extLst>
 </p:presentation>
 </file>
 
@@ -2408,7 +2414,11 @@
         <a:p>
           <a:r>
             <a:rPr lang="th-TH" dirty="0" smtClean="0"/>
-            <a:t>ส่งช่างไปดำเนินการ</a:t>
+            <a:t>ส่งช่างไป</a:t>
+          </a:r>
+          <a:r>
+            <a:rPr lang="th-TH" dirty="0" smtClean="0"/>
+            <a:t>ดำเนินการติดตั้งมิเตอร์</a:t>
           </a:r>
           <a:endParaRPr lang="en-US" dirty="0"/>
         </a:p>
@@ -2500,10 +2510,24 @@
     <dgm:pt modelId="{7EF17BE3-605B-496A-9C41-AD172FC61EBE}" type="pres">
       <dgm:prSet presAssocID="{48A34F00-DF29-4B12-B41F-5C428F133325}" presName="sibTrans" presStyleLbl="sibTrans2D1" presStyleIdx="0" presStyleCnt="2"/>
       <dgm:spPr/>
+      <dgm:t>
+        <a:bodyPr/>
+        <a:lstStyle/>
+        <a:p>
+          <a:endParaRPr lang="en-US"/>
+        </a:p>
+      </dgm:t>
     </dgm:pt>
     <dgm:pt modelId="{953DD5C3-1443-45F3-B556-C1C0CCE9FE49}" type="pres">
       <dgm:prSet presAssocID="{48A34F00-DF29-4B12-B41F-5C428F133325}" presName="connectorText" presStyleLbl="sibTrans2D1" presStyleIdx="0" presStyleCnt="2"/>
       <dgm:spPr/>
+      <dgm:t>
+        <a:bodyPr/>
+        <a:lstStyle/>
+        <a:p>
+          <a:endParaRPr lang="en-US"/>
+        </a:p>
+      </dgm:t>
     </dgm:pt>
     <dgm:pt modelId="{BCB7FB29-8DF4-48AC-B6BF-B4AF6498DD84}" type="pres">
       <dgm:prSet presAssocID="{351E22E0-A2F3-4C1E-9192-6671A29E8216}" presName="node" presStyleLbl="node1" presStyleIdx="1" presStyleCnt="3">
@@ -2512,14 +2536,35 @@
         </dgm:presLayoutVars>
       </dgm:prSet>
       <dgm:spPr/>
+      <dgm:t>
+        <a:bodyPr/>
+        <a:lstStyle/>
+        <a:p>
+          <a:endParaRPr lang="en-US"/>
+        </a:p>
+      </dgm:t>
     </dgm:pt>
     <dgm:pt modelId="{67E772CD-26BB-4AC7-BF43-B3D5DFE9A481}" type="pres">
       <dgm:prSet presAssocID="{A4C5A224-26C1-43BF-AEB0-B1ADCBFE4A72}" presName="sibTrans" presStyleLbl="sibTrans2D1" presStyleIdx="1" presStyleCnt="2"/>
       <dgm:spPr/>
+      <dgm:t>
+        <a:bodyPr/>
+        <a:lstStyle/>
+        <a:p>
+          <a:endParaRPr lang="en-US"/>
+        </a:p>
+      </dgm:t>
     </dgm:pt>
     <dgm:pt modelId="{FCCCDEAE-BFB2-480A-BDB7-A485C1600C06}" type="pres">
       <dgm:prSet presAssocID="{A4C5A224-26C1-43BF-AEB0-B1ADCBFE4A72}" presName="connectorText" presStyleLbl="sibTrans2D1" presStyleIdx="1" presStyleCnt="2"/>
       <dgm:spPr/>
+      <dgm:t>
+        <a:bodyPr/>
+        <a:lstStyle/>
+        <a:p>
+          <a:endParaRPr lang="en-US"/>
+        </a:p>
+      </dgm:t>
     </dgm:pt>
     <dgm:pt modelId="{4C25E873-2307-4020-98AF-39EC51E0CE2B}" type="pres">
       <dgm:prSet presAssocID="{44649FB4-9921-4419-BBE3-DBA5F5BC4294}" presName="node" presStyleLbl="node1" presStyleIdx="2" presStyleCnt="3">
@@ -2538,16 +2583,16 @@
     </dgm:pt>
   </dgm:ptLst>
   <dgm:cxnLst>
+    <dgm:cxn modelId="{38CFDFC7-E5E3-43DE-97DD-2837A22A0807}" type="presOf" srcId="{351E22E0-A2F3-4C1E-9192-6671A29E8216}" destId="{BCB7FB29-8DF4-48AC-B6BF-B4AF6498DD84}" srcOrd="0" destOrd="0" presId="urn:microsoft.com/office/officeart/2005/8/layout/process1"/>
+    <dgm:cxn modelId="{55F2C977-07AF-4454-BDE1-14B34F1CA6A3}" type="presOf" srcId="{44649FB4-9921-4419-BBE3-DBA5F5BC4294}" destId="{4C25E873-2307-4020-98AF-39EC51E0CE2B}" srcOrd="0" destOrd="0" presId="urn:microsoft.com/office/officeart/2005/8/layout/process1"/>
+    <dgm:cxn modelId="{064652F0-6E4F-4490-897A-E81B986BDB12}" srcId="{9A896400-F85A-4766-A65F-50340E516858}" destId="{351E22E0-A2F3-4C1E-9192-6671A29E8216}" srcOrd="1" destOrd="0" parTransId="{4DA292D0-7B7D-40AA-A473-40824C655168}" sibTransId="{A4C5A224-26C1-43BF-AEB0-B1ADCBFE4A72}"/>
+    <dgm:cxn modelId="{182F18BF-2314-43FB-AC32-BB444F521D19}" type="presOf" srcId="{9A896400-F85A-4766-A65F-50340E516858}" destId="{8BF6533F-C10C-4856-ABC6-92ECFC62CC81}" srcOrd="0" destOrd="0" presId="urn:microsoft.com/office/officeart/2005/8/layout/process1"/>
+    <dgm:cxn modelId="{B7CB4922-E1FA-4C30-B1BD-C0F282A3211D}" type="presOf" srcId="{909E249E-3F15-4424-B905-2941768F9620}" destId="{D005F32C-5F10-480F-979C-C610B7B4405A}" srcOrd="0" destOrd="0" presId="urn:microsoft.com/office/officeart/2005/8/layout/process1"/>
+    <dgm:cxn modelId="{F0930B7E-DDE3-4593-9B52-5448C0677C4C}" type="presOf" srcId="{A4C5A224-26C1-43BF-AEB0-B1ADCBFE4A72}" destId="{FCCCDEAE-BFB2-480A-BDB7-A485C1600C06}" srcOrd="1" destOrd="0" presId="urn:microsoft.com/office/officeart/2005/8/layout/process1"/>
+    <dgm:cxn modelId="{101204D5-E7B1-4A3F-AB06-EE943E2C630E}" type="presOf" srcId="{A4C5A224-26C1-43BF-AEB0-B1ADCBFE4A72}" destId="{67E772CD-26BB-4AC7-BF43-B3D5DFE9A481}" srcOrd="0" destOrd="0" presId="urn:microsoft.com/office/officeart/2005/8/layout/process1"/>
     <dgm:cxn modelId="{CA82F310-DD99-4737-A7BC-A8B7831BACD0}" type="presOf" srcId="{48A34F00-DF29-4B12-B41F-5C428F133325}" destId="{953DD5C3-1443-45F3-B556-C1C0CCE9FE49}" srcOrd="1" destOrd="0" presId="urn:microsoft.com/office/officeart/2005/8/layout/process1"/>
-    <dgm:cxn modelId="{101204D5-E7B1-4A3F-AB06-EE943E2C630E}" type="presOf" srcId="{A4C5A224-26C1-43BF-AEB0-B1ADCBFE4A72}" destId="{67E772CD-26BB-4AC7-BF43-B3D5DFE9A481}" srcOrd="0" destOrd="0" presId="urn:microsoft.com/office/officeart/2005/8/layout/process1"/>
     <dgm:cxn modelId="{22A52A17-8318-4E8C-B7F0-73194600EE8D}" type="presOf" srcId="{48A34F00-DF29-4B12-B41F-5C428F133325}" destId="{7EF17BE3-605B-496A-9C41-AD172FC61EBE}" srcOrd="0" destOrd="0" presId="urn:microsoft.com/office/officeart/2005/8/layout/process1"/>
-    <dgm:cxn modelId="{38CFDFC7-E5E3-43DE-97DD-2837A22A0807}" type="presOf" srcId="{351E22E0-A2F3-4C1E-9192-6671A29E8216}" destId="{BCB7FB29-8DF4-48AC-B6BF-B4AF6498DD84}" srcOrd="0" destOrd="0" presId="urn:microsoft.com/office/officeart/2005/8/layout/process1"/>
-    <dgm:cxn modelId="{182F18BF-2314-43FB-AC32-BB444F521D19}" type="presOf" srcId="{9A896400-F85A-4766-A65F-50340E516858}" destId="{8BF6533F-C10C-4856-ABC6-92ECFC62CC81}" srcOrd="0" destOrd="0" presId="urn:microsoft.com/office/officeart/2005/8/layout/process1"/>
-    <dgm:cxn modelId="{064652F0-6E4F-4490-897A-E81B986BDB12}" srcId="{9A896400-F85A-4766-A65F-50340E516858}" destId="{351E22E0-A2F3-4C1E-9192-6671A29E8216}" srcOrd="1" destOrd="0" parTransId="{4DA292D0-7B7D-40AA-A473-40824C655168}" sibTransId="{A4C5A224-26C1-43BF-AEB0-B1ADCBFE4A72}"/>
-    <dgm:cxn modelId="{55F2C977-07AF-4454-BDE1-14B34F1CA6A3}" type="presOf" srcId="{44649FB4-9921-4419-BBE3-DBA5F5BC4294}" destId="{4C25E873-2307-4020-98AF-39EC51E0CE2B}" srcOrd="0" destOrd="0" presId="urn:microsoft.com/office/officeart/2005/8/layout/process1"/>
-    <dgm:cxn modelId="{F0930B7E-DDE3-4593-9B52-5448C0677C4C}" type="presOf" srcId="{A4C5A224-26C1-43BF-AEB0-B1ADCBFE4A72}" destId="{FCCCDEAE-BFB2-480A-BDB7-A485C1600C06}" srcOrd="1" destOrd="0" presId="urn:microsoft.com/office/officeart/2005/8/layout/process1"/>
     <dgm:cxn modelId="{C5E2B373-EDEE-43BD-A6C5-849B2ED213C1}" srcId="{9A896400-F85A-4766-A65F-50340E516858}" destId="{909E249E-3F15-4424-B905-2941768F9620}" srcOrd="0" destOrd="0" parTransId="{6B6AD539-5029-42D2-880C-256C99C36290}" sibTransId="{48A34F00-DF29-4B12-B41F-5C428F133325}"/>
-    <dgm:cxn modelId="{B7CB4922-E1FA-4C30-B1BD-C0F282A3211D}" type="presOf" srcId="{909E249E-3F15-4424-B905-2941768F9620}" destId="{D005F32C-5F10-480F-979C-C610B7B4405A}" srcOrd="0" destOrd="0" presId="urn:microsoft.com/office/officeart/2005/8/layout/process1"/>
     <dgm:cxn modelId="{5C95B970-C1AC-4950-A000-1D9DF04F54B9}" srcId="{9A896400-F85A-4766-A65F-50340E516858}" destId="{44649FB4-9921-4419-BBE3-DBA5F5BC4294}" srcOrd="2" destOrd="0" parTransId="{EF120C7D-E3F2-4D60-840A-C372509F09AF}" sibTransId="{91B6BA90-A934-4C19-9100-619EB1ACDAED}"/>
     <dgm:cxn modelId="{A580C075-3E88-4918-975F-5B51AE3CEC0B}" type="presParOf" srcId="{8BF6533F-C10C-4856-ABC6-92ECFC62CC81}" destId="{D005F32C-5F10-480F-979C-C610B7B4405A}" srcOrd="0" destOrd="0" presId="urn:microsoft.com/office/officeart/2005/8/layout/process1"/>
     <dgm:cxn modelId="{B0AE1450-4602-45E9-B7A8-80FCAFF68284}" type="presParOf" srcId="{8BF6533F-C10C-4856-ABC6-92ECFC62CC81}" destId="{7EF17BE3-605B-496A-9C41-AD172FC61EBE}" srcOrd="1" destOrd="0" presId="urn:microsoft.com/office/officeart/2005/8/layout/process1"/>
@@ -2620,7 +2665,11 @@
         <a:p>
           <a:r>
             <a:rPr lang="th-TH" dirty="0" smtClean="0"/>
-            <a:t>ส่งช่างไปดำเนินการ</a:t>
+            <a:t>ส่งช่างไป</a:t>
+          </a:r>
+          <a:r>
+            <a:rPr lang="th-TH" dirty="0" smtClean="0"/>
+            <a:t>ดำเนินการรื้อถอนมิเตอร์</a:t>
           </a:r>
           <a:endParaRPr lang="en-US" dirty="0"/>
         </a:p>
@@ -2675,10 +2724,24 @@
     <dgm:pt modelId="{7EF17BE3-605B-496A-9C41-AD172FC61EBE}" type="pres">
       <dgm:prSet presAssocID="{48A34F00-DF29-4B12-B41F-5C428F133325}" presName="sibTrans" presStyleLbl="sibTrans2D1" presStyleIdx="0" presStyleCnt="1"/>
       <dgm:spPr/>
+      <dgm:t>
+        <a:bodyPr/>
+        <a:lstStyle/>
+        <a:p>
+          <a:endParaRPr lang="en-US"/>
+        </a:p>
+      </dgm:t>
     </dgm:pt>
     <dgm:pt modelId="{953DD5C3-1443-45F3-B556-C1C0CCE9FE49}" type="pres">
       <dgm:prSet presAssocID="{48A34F00-DF29-4B12-B41F-5C428F133325}" presName="connectorText" presStyleLbl="sibTrans2D1" presStyleIdx="0" presStyleCnt="1"/>
       <dgm:spPr/>
+      <dgm:t>
+        <a:bodyPr/>
+        <a:lstStyle/>
+        <a:p>
+          <a:endParaRPr lang="en-US"/>
+        </a:p>
+      </dgm:t>
     </dgm:pt>
     <dgm:pt modelId="{BCB7FB29-8DF4-48AC-B6BF-B4AF6498DD84}" type="pres">
       <dgm:prSet presAssocID="{351E22E0-A2F3-4C1E-9192-6671A29E8216}" presName="node" presStyleLbl="node1" presStyleIdx="1" presStyleCnt="2">
@@ -2687,16 +2750,23 @@
         </dgm:presLayoutVars>
       </dgm:prSet>
       <dgm:spPr/>
+      <dgm:t>
+        <a:bodyPr/>
+        <a:lstStyle/>
+        <a:p>
+          <a:endParaRPr lang="en-US"/>
+        </a:p>
+      </dgm:t>
     </dgm:pt>
   </dgm:ptLst>
   <dgm:cxnLst>
+    <dgm:cxn modelId="{38CFDFC7-E5E3-43DE-97DD-2837A22A0807}" type="presOf" srcId="{351E22E0-A2F3-4C1E-9192-6671A29E8216}" destId="{BCB7FB29-8DF4-48AC-B6BF-B4AF6498DD84}" srcOrd="0" destOrd="0" presId="urn:microsoft.com/office/officeart/2005/8/layout/process1"/>
+    <dgm:cxn modelId="{064652F0-6E4F-4490-897A-E81B986BDB12}" srcId="{9A896400-F85A-4766-A65F-50340E516858}" destId="{351E22E0-A2F3-4C1E-9192-6671A29E8216}" srcOrd="1" destOrd="0" parTransId="{4DA292D0-7B7D-40AA-A473-40824C655168}" sibTransId="{A4C5A224-26C1-43BF-AEB0-B1ADCBFE4A72}"/>
     <dgm:cxn modelId="{CA82F310-DD99-4737-A7BC-A8B7831BACD0}" type="presOf" srcId="{48A34F00-DF29-4B12-B41F-5C428F133325}" destId="{953DD5C3-1443-45F3-B556-C1C0CCE9FE49}" srcOrd="1" destOrd="0" presId="urn:microsoft.com/office/officeart/2005/8/layout/process1"/>
-    <dgm:cxn modelId="{182F18BF-2314-43FB-AC32-BB444F521D19}" type="presOf" srcId="{9A896400-F85A-4766-A65F-50340E516858}" destId="{8BF6533F-C10C-4856-ABC6-92ECFC62CC81}" srcOrd="0" destOrd="0" presId="urn:microsoft.com/office/officeart/2005/8/layout/process1"/>
+    <dgm:cxn modelId="{22A52A17-8318-4E8C-B7F0-73194600EE8D}" type="presOf" srcId="{48A34F00-DF29-4B12-B41F-5C428F133325}" destId="{7EF17BE3-605B-496A-9C41-AD172FC61EBE}" srcOrd="0" destOrd="0" presId="urn:microsoft.com/office/officeart/2005/8/layout/process1"/>
     <dgm:cxn modelId="{C5E2B373-EDEE-43BD-A6C5-849B2ED213C1}" srcId="{9A896400-F85A-4766-A65F-50340E516858}" destId="{909E249E-3F15-4424-B905-2941768F9620}" srcOrd="0" destOrd="0" parTransId="{6B6AD539-5029-42D2-880C-256C99C36290}" sibTransId="{48A34F00-DF29-4B12-B41F-5C428F133325}"/>
     <dgm:cxn modelId="{B7CB4922-E1FA-4C30-B1BD-C0F282A3211D}" type="presOf" srcId="{909E249E-3F15-4424-B905-2941768F9620}" destId="{D005F32C-5F10-480F-979C-C610B7B4405A}" srcOrd="0" destOrd="0" presId="urn:microsoft.com/office/officeart/2005/8/layout/process1"/>
-    <dgm:cxn modelId="{22A52A17-8318-4E8C-B7F0-73194600EE8D}" type="presOf" srcId="{48A34F00-DF29-4B12-B41F-5C428F133325}" destId="{7EF17BE3-605B-496A-9C41-AD172FC61EBE}" srcOrd="0" destOrd="0" presId="urn:microsoft.com/office/officeart/2005/8/layout/process1"/>
-    <dgm:cxn modelId="{38CFDFC7-E5E3-43DE-97DD-2837A22A0807}" type="presOf" srcId="{351E22E0-A2F3-4C1E-9192-6671A29E8216}" destId="{BCB7FB29-8DF4-48AC-B6BF-B4AF6498DD84}" srcOrd="0" destOrd="0" presId="urn:microsoft.com/office/officeart/2005/8/layout/process1"/>
-    <dgm:cxn modelId="{064652F0-6E4F-4490-897A-E81B986BDB12}" srcId="{9A896400-F85A-4766-A65F-50340E516858}" destId="{351E22E0-A2F3-4C1E-9192-6671A29E8216}" srcOrd="1" destOrd="0" parTransId="{4DA292D0-7B7D-40AA-A473-40824C655168}" sibTransId="{A4C5A224-26C1-43BF-AEB0-B1ADCBFE4A72}"/>
+    <dgm:cxn modelId="{182F18BF-2314-43FB-AC32-BB444F521D19}" type="presOf" srcId="{9A896400-F85A-4766-A65F-50340E516858}" destId="{8BF6533F-C10C-4856-ABC6-92ECFC62CC81}" srcOrd="0" destOrd="0" presId="urn:microsoft.com/office/officeart/2005/8/layout/process1"/>
     <dgm:cxn modelId="{A580C075-3E88-4918-975F-5B51AE3CEC0B}" type="presParOf" srcId="{8BF6533F-C10C-4856-ABC6-92ECFC62CC81}" destId="{D005F32C-5F10-480F-979C-C610B7B4405A}" srcOrd="0" destOrd="0" presId="urn:microsoft.com/office/officeart/2005/8/layout/process1"/>
     <dgm:cxn modelId="{B0AE1450-4602-45E9-B7A8-80FCAFF68284}" type="presParOf" srcId="{8BF6533F-C10C-4856-ABC6-92ECFC62CC81}" destId="{7EF17BE3-605B-496A-9C41-AD172FC61EBE}" srcOrd="1" destOrd="0" presId="urn:microsoft.com/office/officeart/2005/8/layout/process1"/>
     <dgm:cxn modelId="{EF2B131F-DD22-4D39-B4F9-2980BE63E97B}" type="presParOf" srcId="{7EF17BE3-605B-496A-9C41-AD172FC61EBE}" destId="{953DD5C3-1443-45F3-B556-C1C0CCE9FE49}" srcOrd="0" destOrd="0" presId="urn:microsoft.com/office/officeart/2005/8/layout/process1"/>
@@ -2956,6 +3026,13 @@
         </dgm:presLayoutVars>
       </dgm:prSet>
       <dgm:spPr/>
+      <dgm:t>
+        <a:bodyPr/>
+        <a:lstStyle/>
+        <a:p>
+          <a:endParaRPr lang="en-US"/>
+        </a:p>
+      </dgm:t>
     </dgm:pt>
     <dgm:pt modelId="{11D3C5C2-AAC3-4847-BB91-161F128869D7}" type="pres">
       <dgm:prSet presAssocID="{CD7C0CBA-86C9-4807-9E98-6221B1B0F5CE}" presName="node" presStyleLbl="node1" presStyleIdx="0" presStyleCnt="6">
@@ -2964,14 +3041,35 @@
         </dgm:presLayoutVars>
       </dgm:prSet>
       <dgm:spPr/>
+      <dgm:t>
+        <a:bodyPr/>
+        <a:lstStyle/>
+        <a:p>
+          <a:endParaRPr lang="en-US"/>
+        </a:p>
+      </dgm:t>
     </dgm:pt>
     <dgm:pt modelId="{5360115D-DFE8-46BB-BE46-0864AC22A20D}" type="pres">
       <dgm:prSet presAssocID="{CEA7AC7F-7599-40A2-A540-A257A189675D}" presName="sibTrans" presStyleLbl="sibTrans2D1" presStyleIdx="0" presStyleCnt="6"/>
       <dgm:spPr/>
+      <dgm:t>
+        <a:bodyPr/>
+        <a:lstStyle/>
+        <a:p>
+          <a:endParaRPr lang="en-US"/>
+        </a:p>
+      </dgm:t>
     </dgm:pt>
     <dgm:pt modelId="{4FA759C2-07B7-4598-B356-95AB1D513139}" type="pres">
       <dgm:prSet presAssocID="{CEA7AC7F-7599-40A2-A540-A257A189675D}" presName="connectorText" presStyleLbl="sibTrans2D1" presStyleIdx="0" presStyleCnt="6"/>
       <dgm:spPr/>
+      <dgm:t>
+        <a:bodyPr/>
+        <a:lstStyle/>
+        <a:p>
+          <a:endParaRPr lang="en-US"/>
+        </a:p>
+      </dgm:t>
     </dgm:pt>
     <dgm:pt modelId="{AE599ACC-6885-4DC5-A229-CC04145B2CC7}" type="pres">
       <dgm:prSet presAssocID="{AB7729A9-A48C-4E3B-8766-FAD602C0651F}" presName="node" presStyleLbl="node1" presStyleIdx="1" presStyleCnt="6">
@@ -2980,14 +3078,35 @@
         </dgm:presLayoutVars>
       </dgm:prSet>
       <dgm:spPr/>
+      <dgm:t>
+        <a:bodyPr/>
+        <a:lstStyle/>
+        <a:p>
+          <a:endParaRPr lang="en-US"/>
+        </a:p>
+      </dgm:t>
     </dgm:pt>
     <dgm:pt modelId="{83484589-B909-4314-88CA-C25157B8A229}" type="pres">
       <dgm:prSet presAssocID="{59A499A9-422C-4E3B-8C95-43CBC3E92817}" presName="sibTrans" presStyleLbl="sibTrans2D1" presStyleIdx="1" presStyleCnt="6"/>
       <dgm:spPr/>
+      <dgm:t>
+        <a:bodyPr/>
+        <a:lstStyle/>
+        <a:p>
+          <a:endParaRPr lang="en-US"/>
+        </a:p>
+      </dgm:t>
     </dgm:pt>
     <dgm:pt modelId="{6F43B2A4-FA35-455D-8206-41FACFC85D27}" type="pres">
       <dgm:prSet presAssocID="{59A499A9-422C-4E3B-8C95-43CBC3E92817}" presName="connectorText" presStyleLbl="sibTrans2D1" presStyleIdx="1" presStyleCnt="6"/>
       <dgm:spPr/>
+      <dgm:t>
+        <a:bodyPr/>
+        <a:lstStyle/>
+        <a:p>
+          <a:endParaRPr lang="en-US"/>
+        </a:p>
+      </dgm:t>
     </dgm:pt>
     <dgm:pt modelId="{9BA96E04-54F7-4C10-9AE4-7E2FC78D0D86}" type="pres">
       <dgm:prSet presAssocID="{FACB2B15-0BB7-41CE-A0BB-E512F8E4F480}" presName="node" presStyleLbl="node1" presStyleIdx="2" presStyleCnt="6">
@@ -3007,10 +3126,24 @@
     <dgm:pt modelId="{57296857-4242-4235-B144-513ECFBD9B23}" type="pres">
       <dgm:prSet presAssocID="{5816FF00-E817-49BA-88BB-EDEBFC989C64}" presName="sibTrans" presStyleLbl="sibTrans2D1" presStyleIdx="2" presStyleCnt="6"/>
       <dgm:spPr/>
+      <dgm:t>
+        <a:bodyPr/>
+        <a:lstStyle/>
+        <a:p>
+          <a:endParaRPr lang="en-US"/>
+        </a:p>
+      </dgm:t>
     </dgm:pt>
     <dgm:pt modelId="{1CAC42F1-51FE-4698-B8FC-90A0B830147E}" type="pres">
       <dgm:prSet presAssocID="{5816FF00-E817-49BA-88BB-EDEBFC989C64}" presName="connectorText" presStyleLbl="sibTrans2D1" presStyleIdx="2" presStyleCnt="6"/>
       <dgm:spPr/>
+      <dgm:t>
+        <a:bodyPr/>
+        <a:lstStyle/>
+        <a:p>
+          <a:endParaRPr lang="en-US"/>
+        </a:p>
+      </dgm:t>
     </dgm:pt>
     <dgm:pt modelId="{EADCCA45-FFBE-4078-B6DA-6BE3D1940A41}" type="pres">
       <dgm:prSet presAssocID="{AB89D21A-A275-490D-A362-78FF21798947}" presName="node" presStyleLbl="node1" presStyleIdx="3" presStyleCnt="6">
@@ -3030,10 +3163,24 @@
     <dgm:pt modelId="{CC5561CF-7ABD-4EF6-885C-BA485653DACF}" type="pres">
       <dgm:prSet presAssocID="{D67E668A-9D1E-4369-8093-BF29FF92701E}" presName="sibTrans" presStyleLbl="sibTrans2D1" presStyleIdx="3" presStyleCnt="6"/>
       <dgm:spPr/>
+      <dgm:t>
+        <a:bodyPr/>
+        <a:lstStyle/>
+        <a:p>
+          <a:endParaRPr lang="en-US"/>
+        </a:p>
+      </dgm:t>
     </dgm:pt>
     <dgm:pt modelId="{DE2EAD1A-18C0-4662-83A8-B70B94AAEA87}" type="pres">
       <dgm:prSet presAssocID="{D67E668A-9D1E-4369-8093-BF29FF92701E}" presName="connectorText" presStyleLbl="sibTrans2D1" presStyleIdx="3" presStyleCnt="6"/>
       <dgm:spPr/>
+      <dgm:t>
+        <a:bodyPr/>
+        <a:lstStyle/>
+        <a:p>
+          <a:endParaRPr lang="en-US"/>
+        </a:p>
+      </dgm:t>
     </dgm:pt>
     <dgm:pt modelId="{72D30368-5AE8-4A7A-85BA-C70E9B94BDB1}" type="pres">
       <dgm:prSet presAssocID="{FB9DB6F9-0BFC-499F-BA72-BB523A5B246A}" presName="node" presStyleLbl="node1" presStyleIdx="4" presStyleCnt="6">
@@ -3053,10 +3200,24 @@
     <dgm:pt modelId="{FDAEDC18-3CED-499B-BFAF-631E9E280EDC}" type="pres">
       <dgm:prSet presAssocID="{F40EC92D-1EC1-4823-9AC0-7F5B1DFEE20E}" presName="sibTrans" presStyleLbl="sibTrans2D1" presStyleIdx="4" presStyleCnt="6"/>
       <dgm:spPr/>
+      <dgm:t>
+        <a:bodyPr/>
+        <a:lstStyle/>
+        <a:p>
+          <a:endParaRPr lang="en-US"/>
+        </a:p>
+      </dgm:t>
     </dgm:pt>
     <dgm:pt modelId="{BA4F4C67-A12B-4138-8A9D-95528BBB1861}" type="pres">
       <dgm:prSet presAssocID="{F40EC92D-1EC1-4823-9AC0-7F5B1DFEE20E}" presName="connectorText" presStyleLbl="sibTrans2D1" presStyleIdx="4" presStyleCnt="6"/>
       <dgm:spPr/>
+      <dgm:t>
+        <a:bodyPr/>
+        <a:lstStyle/>
+        <a:p>
+          <a:endParaRPr lang="en-US"/>
+        </a:p>
+      </dgm:t>
     </dgm:pt>
     <dgm:pt modelId="{2A192A00-99C4-4FC8-BBA6-DF66E75D8CD5}" type="pres">
       <dgm:prSet presAssocID="{1279C048-3EED-4986-B0E4-58989EBEDB84}" presName="node" presStyleLbl="node1" presStyleIdx="5" presStyleCnt="6">
@@ -3065,14 +3226,35 @@
         </dgm:presLayoutVars>
       </dgm:prSet>
       <dgm:spPr/>
+      <dgm:t>
+        <a:bodyPr/>
+        <a:lstStyle/>
+        <a:p>
+          <a:endParaRPr lang="en-US"/>
+        </a:p>
+      </dgm:t>
     </dgm:pt>
     <dgm:pt modelId="{8CD3BB83-44C3-4F0F-88F0-940866A47D27}" type="pres">
       <dgm:prSet presAssocID="{F20ECE41-48B7-45C9-B00C-67889CABFB69}" presName="sibTrans" presStyleLbl="sibTrans2D1" presStyleIdx="5" presStyleCnt="6"/>
       <dgm:spPr/>
+      <dgm:t>
+        <a:bodyPr/>
+        <a:lstStyle/>
+        <a:p>
+          <a:endParaRPr lang="en-US"/>
+        </a:p>
+      </dgm:t>
     </dgm:pt>
     <dgm:pt modelId="{9734B1E3-4A4B-433E-BCCD-8F46515AB972}" type="pres">
       <dgm:prSet presAssocID="{F20ECE41-48B7-45C9-B00C-67889CABFB69}" presName="connectorText" presStyleLbl="sibTrans2D1" presStyleIdx="5" presStyleCnt="6"/>
       <dgm:spPr/>
+      <dgm:t>
+        <a:bodyPr/>
+        <a:lstStyle/>
+        <a:p>
+          <a:endParaRPr lang="en-US"/>
+        </a:p>
+      </dgm:t>
     </dgm:pt>
   </dgm:ptLst>
   <dgm:cxnLst>
@@ -3189,12 +3371,12 @@
         </a:fontRef>
       </dsp:style>
       <dsp:txBody>
-        <a:bodyPr spcFirstLastPara="0" vert="horz" wrap="square" lIns="133350" tIns="133350" rIns="133350" bIns="133350" numCol="1" spcCol="1270" anchor="ctr" anchorCtr="0">
+        <a:bodyPr spcFirstLastPara="0" vert="horz" wrap="square" lIns="129540" tIns="129540" rIns="129540" bIns="129540" numCol="1" spcCol="1270" anchor="ctr" anchorCtr="0">
           <a:noAutofit/>
         </a:bodyPr>
         <a:lstStyle/>
         <a:p>
-          <a:pPr lvl="0" algn="ctr" defTabSz="1555750">
+          <a:pPr lvl="0" algn="ctr" defTabSz="1511300">
             <a:lnSpc>
               <a:spcPct val="90000"/>
             </a:lnSpc>
@@ -3206,10 +3388,10 @@
             </a:spcAft>
           </a:pPr>
           <a:r>
-            <a:rPr lang="th-TH" sz="3500" kern="1200" dirty="0" smtClean="0"/>
+            <a:rPr lang="th-TH" sz="3400" kern="1200" dirty="0" smtClean="0"/>
             <a:t>กรอกแบบฟอร์มการขอติดตั้งประปา</a:t>
           </a:r>
-          <a:endParaRPr lang="en-US" sz="3500" kern="1200" dirty="0"/>
+          <a:endParaRPr lang="en-US" sz="3400" kern="1200" dirty="0"/>
         </a:p>
       </dsp:txBody>
       <dsp:txXfrm>
@@ -3267,7 +3449,7 @@
         </a:bodyPr>
         <a:lstStyle/>
         <a:p>
-          <a:pPr lvl="0" algn="ctr" defTabSz="1244600">
+          <a:pPr lvl="0" algn="ctr" defTabSz="1200150">
             <a:lnSpc>
               <a:spcPct val="90000"/>
             </a:lnSpc>
@@ -3278,7 +3460,7 @@
               <a:spcPct val="35000"/>
             </a:spcAft>
           </a:pPr>
-          <a:endParaRPr lang="en-US" sz="2800" kern="1200"/>
+          <a:endParaRPr lang="en-US" sz="2700" kern="1200"/>
         </a:p>
       </dsp:txBody>
       <dsp:txXfrm>
@@ -3337,12 +3519,12 @@
         </a:fontRef>
       </dsp:style>
       <dsp:txBody>
-        <a:bodyPr spcFirstLastPara="0" vert="horz" wrap="square" lIns="133350" tIns="133350" rIns="133350" bIns="133350" numCol="1" spcCol="1270" anchor="ctr" anchorCtr="0">
+        <a:bodyPr spcFirstLastPara="0" vert="horz" wrap="square" lIns="129540" tIns="129540" rIns="129540" bIns="129540" numCol="1" spcCol="1270" anchor="ctr" anchorCtr="0">
           <a:noAutofit/>
         </a:bodyPr>
         <a:lstStyle/>
         <a:p>
-          <a:pPr lvl="0" algn="ctr" defTabSz="1555750">
+          <a:pPr lvl="0" algn="ctr" defTabSz="1511300">
             <a:lnSpc>
               <a:spcPct val="90000"/>
             </a:lnSpc>
@@ -3354,10 +3536,14 @@
             </a:spcAft>
           </a:pPr>
           <a:r>
-            <a:rPr lang="th-TH" sz="3500" kern="1200" dirty="0" smtClean="0"/>
-            <a:t>ส่งช่างไปดำเนินการ</a:t>
+            <a:rPr lang="th-TH" sz="3400" kern="1200" dirty="0" smtClean="0"/>
+            <a:t>ส่งช่างไป</a:t>
           </a:r>
-          <a:endParaRPr lang="en-US" sz="3500" kern="1200" dirty="0"/>
+          <a:r>
+            <a:rPr lang="th-TH" sz="3400" kern="1200" dirty="0" smtClean="0"/>
+            <a:t>ดำเนินการติดตั้งมิเตอร์</a:t>
+          </a:r>
+          <a:endParaRPr lang="en-US" sz="3400" kern="1200" dirty="0"/>
         </a:p>
       </dsp:txBody>
       <dsp:txXfrm>
@@ -3415,7 +3601,7 @@
         </a:bodyPr>
         <a:lstStyle/>
         <a:p>
-          <a:pPr lvl="0" algn="ctr" defTabSz="1244600">
+          <a:pPr lvl="0" algn="ctr" defTabSz="1200150">
             <a:lnSpc>
               <a:spcPct val="90000"/>
             </a:lnSpc>
@@ -3426,7 +3612,7 @@
               <a:spcPct val="35000"/>
             </a:spcAft>
           </a:pPr>
-          <a:endParaRPr lang="en-US" sz="2800" kern="1200"/>
+          <a:endParaRPr lang="en-US" sz="2700" kern="1200"/>
         </a:p>
       </dsp:txBody>
       <dsp:txXfrm>
@@ -3485,12 +3671,12 @@
         </a:fontRef>
       </dsp:style>
       <dsp:txBody>
-        <a:bodyPr spcFirstLastPara="0" vert="horz" wrap="square" lIns="133350" tIns="133350" rIns="133350" bIns="133350" numCol="1" spcCol="1270" anchor="ctr" anchorCtr="0">
+        <a:bodyPr spcFirstLastPara="0" vert="horz" wrap="square" lIns="129540" tIns="129540" rIns="129540" bIns="129540" numCol="1" spcCol="1270" anchor="ctr" anchorCtr="0">
           <a:noAutofit/>
         </a:bodyPr>
         <a:lstStyle/>
         <a:p>
-          <a:pPr lvl="0" algn="ctr" defTabSz="1555750">
+          <a:pPr lvl="0" algn="ctr" defTabSz="1511300">
             <a:lnSpc>
               <a:spcPct val="90000"/>
             </a:lnSpc>
@@ -3502,10 +3688,10 @@
             </a:spcAft>
           </a:pPr>
           <a:r>
-            <a:rPr lang="th-TH" sz="3500" kern="1200" dirty="0" smtClean="0"/>
+            <a:rPr lang="th-TH" sz="3400" kern="1200" dirty="0" smtClean="0"/>
             <a:t>ออกบิลเรียกเก็บ</a:t>
           </a:r>
-          <a:endParaRPr lang="en-US" sz="3500" kern="1200" dirty="0"/>
+          <a:endParaRPr lang="en-US" sz="3400" kern="1200" dirty="0"/>
         </a:p>
       </dsp:txBody>
       <dsp:txXfrm>
@@ -3742,7 +3928,11 @@
           </a:pPr>
           <a:r>
             <a:rPr lang="th-TH" sz="5400" kern="1200" dirty="0" smtClean="0"/>
-            <a:t>ส่งช่างไปดำเนินการ</a:t>
+            <a:t>ส่งช่างไป</a:t>
+          </a:r>
+          <a:r>
+            <a:rPr lang="th-TH" sz="5400" kern="1200" dirty="0" smtClean="0"/>
+            <a:t>ดำเนินการรื้อถอนมิเตอร์</a:t>
           </a:r>
           <a:endParaRPr lang="en-US" sz="5400" kern="1200" dirty="0"/>
         </a:p>
@@ -8421,7 +8611,7 @@
             <a:fld id="{B61BEF0D-F0BB-DE4B-95CE-6DB70DBA9567}" type="datetimeFigureOut">
               <a:rPr lang="en-US" smtClean="0"/>
               <a:pPr/>
-              <a:t>8/15/2016</a:t>
+              <a:t>8/16/2016</a:t>
             </a:fld>
             <a:endParaRPr lang="en-US" dirty="0"/>
           </a:p>
@@ -8735,7 +8925,7 @@
             <a:fld id="{B61BEF0D-F0BB-DE4B-95CE-6DB70DBA9567}" type="datetimeFigureOut">
               <a:rPr lang="en-US" smtClean="0"/>
               <a:pPr/>
-              <a:t>8/15/2016</a:t>
+              <a:t>8/16/2016</a:t>
             </a:fld>
             <a:endParaRPr lang="en-US" dirty="0"/>
           </a:p>
@@ -8959,7 +9149,7 @@
             <a:fld id="{B61BEF0D-F0BB-DE4B-95CE-6DB70DBA9567}" type="datetimeFigureOut">
               <a:rPr lang="en-US" smtClean="0"/>
               <a:pPr/>
-              <a:t>8/15/2016</a:t>
+              <a:t>8/16/2016</a:t>
             </a:fld>
             <a:endParaRPr lang="en-US" dirty="0"/>
           </a:p>
@@ -9252,7 +9442,7 @@
             <a:fld id="{B61BEF0D-F0BB-DE4B-95CE-6DB70DBA9567}" type="datetimeFigureOut">
               <a:rPr lang="en-US" smtClean="0"/>
               <a:pPr/>
-              <a:t>8/15/2016</a:t>
+              <a:t>8/16/2016</a:t>
             </a:fld>
             <a:endParaRPr lang="en-US" dirty="0"/>
           </a:p>
@@ -9708,7 +9898,7 @@
             <a:fld id="{B61BEF0D-F0BB-DE4B-95CE-6DB70DBA9567}" type="datetimeFigureOut">
               <a:rPr lang="en-US" smtClean="0"/>
               <a:pPr/>
-              <a:t>8/15/2016</a:t>
+              <a:t>8/16/2016</a:t>
             </a:fld>
             <a:endParaRPr lang="en-US" dirty="0"/>
           </a:p>
@@ -10286,7 +10476,7 @@
             <a:fld id="{B61BEF0D-F0BB-DE4B-95CE-6DB70DBA9567}" type="datetimeFigureOut">
               <a:rPr lang="en-US" smtClean="0"/>
               <a:pPr/>
-              <a:t>8/15/2016</a:t>
+              <a:t>8/16/2016</a:t>
             </a:fld>
             <a:endParaRPr lang="en-US" dirty="0"/>
           </a:p>
@@ -11140,7 +11330,7 @@
             <a:fld id="{B61BEF0D-F0BB-DE4B-95CE-6DB70DBA9567}" type="datetimeFigureOut">
               <a:rPr lang="en-US" smtClean="0"/>
               <a:pPr/>
-              <a:t>8/15/2016</a:t>
+              <a:t>8/16/2016</a:t>
             </a:fld>
             <a:endParaRPr lang="en-US" dirty="0"/>
           </a:p>
@@ -11347,7 +11537,7 @@
             <a:fld id="{B61BEF0D-F0BB-DE4B-95CE-6DB70DBA9567}" type="datetimeFigureOut">
               <a:rPr lang="en-US" smtClean="0"/>
               <a:pPr/>
-              <a:t>8/15/2016</a:t>
+              <a:t>8/16/2016</a:t>
             </a:fld>
             <a:endParaRPr lang="en-US" dirty="0"/>
           </a:p>
@@ -11563,7 +11753,7 @@
             <a:fld id="{B61BEF0D-F0BB-DE4B-95CE-6DB70DBA9567}" type="datetimeFigureOut">
               <a:rPr lang="en-US" smtClean="0"/>
               <a:pPr/>
-              <a:t>8/15/2016</a:t>
+              <a:t>8/16/2016</a:t>
             </a:fld>
             <a:endParaRPr lang="en-US" dirty="0"/>
           </a:p>
@@ -11770,7 +11960,7 @@
             <a:fld id="{B61BEF0D-F0BB-DE4B-95CE-6DB70DBA9567}" type="datetimeFigureOut">
               <a:rPr lang="en-US" smtClean="0"/>
               <a:pPr/>
-              <a:t>8/15/2016</a:t>
+              <a:t>8/16/2016</a:t>
             </a:fld>
             <a:endParaRPr lang="en-US" dirty="0"/>
           </a:p>
@@ -12052,7 +12242,7 @@
             <a:fld id="{B61BEF0D-F0BB-DE4B-95CE-6DB70DBA9567}" type="datetimeFigureOut">
               <a:rPr lang="en-US" smtClean="0"/>
               <a:pPr/>
-              <a:t>8/15/2016</a:t>
+              <a:t>8/16/2016</a:t>
             </a:fld>
             <a:endParaRPr lang="en-US" dirty="0"/>
           </a:p>
@@ -12321,7 +12511,7 @@
             <a:fld id="{B61BEF0D-F0BB-DE4B-95CE-6DB70DBA9567}" type="datetimeFigureOut">
               <a:rPr lang="en-US" smtClean="0"/>
               <a:pPr/>
-              <a:t>8/15/2016</a:t>
+              <a:t>8/16/2016</a:t>
             </a:fld>
             <a:endParaRPr lang="en-US" dirty="0"/>
           </a:p>
@@ -12738,7 +12928,7 @@
             <a:fld id="{B61BEF0D-F0BB-DE4B-95CE-6DB70DBA9567}" type="datetimeFigureOut">
               <a:rPr lang="en-US" smtClean="0"/>
               <a:pPr/>
-              <a:t>8/15/2016</a:t>
+              <a:t>8/16/2016</a:t>
             </a:fld>
             <a:endParaRPr lang="en-US" dirty="0"/>
           </a:p>
@@ -12888,7 +13078,7 @@
             <a:fld id="{B61BEF0D-F0BB-DE4B-95CE-6DB70DBA9567}" type="datetimeFigureOut">
               <a:rPr lang="en-US" smtClean="0"/>
               <a:pPr/>
-              <a:t>8/15/2016</a:t>
+              <a:t>8/16/2016</a:t>
             </a:fld>
             <a:endParaRPr lang="en-US" dirty="0"/>
           </a:p>
@@ -13015,7 +13205,7 @@
             <a:fld id="{B61BEF0D-F0BB-DE4B-95CE-6DB70DBA9567}" type="datetimeFigureOut">
               <a:rPr lang="en-US" smtClean="0"/>
               <a:pPr/>
-              <a:t>8/15/2016</a:t>
+              <a:t>8/16/2016</a:t>
             </a:fld>
             <a:endParaRPr lang="en-US" dirty="0"/>
           </a:p>
@@ -13296,7 +13486,7 @@
             <a:fld id="{B61BEF0D-F0BB-DE4B-95CE-6DB70DBA9567}" type="datetimeFigureOut">
               <a:rPr lang="en-US" smtClean="0"/>
               <a:pPr/>
-              <a:t>8/15/2016</a:t>
+              <a:t>8/16/2016</a:t>
             </a:fld>
             <a:endParaRPr lang="en-US" dirty="0"/>
           </a:p>
@@ -13610,7 +13800,7 @@
             <a:fld id="{B61BEF0D-F0BB-DE4B-95CE-6DB70DBA9567}" type="datetimeFigureOut">
               <a:rPr lang="en-US" smtClean="0"/>
               <a:pPr/>
-              <a:t>8/15/2016</a:t>
+              <a:t>8/16/2016</a:t>
             </a:fld>
             <a:endParaRPr lang="en-US" dirty="0"/>
           </a:p>
@@ -13865,7 +14055,7 @@
             <a:fld id="{B61BEF0D-F0BB-DE4B-95CE-6DB70DBA9567}" type="datetimeFigureOut">
               <a:rPr lang="en-US" smtClean="0"/>
               <a:pPr/>
-              <a:t>8/15/2016</a:t>
+              <a:t>8/16/2016</a:t>
             </a:fld>
             <a:endParaRPr lang="en-US" dirty="0"/>
           </a:p>
@@ -14897,7 +15087,7 @@
             <p:ph sz="quarter" idx="13"/>
             <p:extLst>
               <p:ext uri="{D42A27DB-BD31-4B8C-83A1-F6EECF244321}">
-                <p14:modId xmlns:p14="http://schemas.microsoft.com/office/powerpoint/2010/main" val="1895244966"/>
+                <p14:modId xmlns:p14="http://schemas.microsoft.com/office/powerpoint/2010/main" val="3511610644"/>
               </p:ext>
             </p:extLst>
           </p:nvPr>
@@ -15015,7 +15205,7 @@
             <p:ph sz="quarter" idx="13"/>
             <p:extLst>
               <p:ext uri="{D42A27DB-BD31-4B8C-83A1-F6EECF244321}">
-                <p14:modId xmlns:p14="http://schemas.microsoft.com/office/powerpoint/2010/main" val="1190406334"/>
+                <p14:modId xmlns:p14="http://schemas.microsoft.com/office/powerpoint/2010/main" val="3246570811"/>
               </p:ext>
             </p:extLst>
           </p:nvPr>
@@ -15527,7 +15717,59 @@
           <a:bodyPr/>
           <a:lstStyle/>
           <a:p>
-            <a:endParaRPr lang="th-TH"/>
+            <a:r>
+              <a:rPr lang="th-TH" dirty="0" smtClean="0"/>
+              <a:t>วิธีการออกบิล</a:t>
+            </a:r>
+          </a:p>
+          <a:p>
+            <a:pPr lvl="1"/>
+            <a:r>
+              <a:rPr lang="th-TH" dirty="0" smtClean="0"/>
+              <a:t>ออกบิลด้วยมือด้วยจำนวนลูกค้า 700 ราย / เดือน</a:t>
+            </a:r>
+          </a:p>
+          <a:p>
+            <a:pPr lvl="2"/>
+            <a:r>
+              <a:rPr lang="th-TH" dirty="0" smtClean="0"/>
+              <a:t>ข้อผิดพลาดด้านตัวเลข</a:t>
+            </a:r>
+          </a:p>
+          <a:p>
+            <a:pPr lvl="1"/>
+            <a:r>
+              <a:rPr lang="th-TH" dirty="0" smtClean="0"/>
+              <a:t>การยกเลิกบิล</a:t>
+            </a:r>
+          </a:p>
+          <a:p>
+            <a:pPr lvl="2"/>
+            <a:r>
+              <a:rPr lang="th-TH" dirty="0" smtClean="0"/>
+              <a:t>ยุ่งยาก</a:t>
+            </a:r>
+          </a:p>
+          <a:p>
+            <a:r>
+              <a:rPr lang="th-TH" dirty="0" smtClean="0"/>
+              <a:t>การทำรายงาน</a:t>
+            </a:r>
+          </a:p>
+          <a:p>
+            <a:pPr lvl="1"/>
+            <a:r>
+              <a:rPr lang="th-TH" dirty="0" smtClean="0"/>
+              <a:t>ไม่มีรายงานอย่างเป็นทางการ</a:t>
+            </a:r>
+          </a:p>
+          <a:p>
+            <a:pPr lvl="1"/>
+            <a:r>
+              <a:rPr lang="th-TH" dirty="0" smtClean="0"/>
+              <a:t>อาศัยข้อมูลในสมุดคุมยอด</a:t>
+            </a:r>
+            <a:endParaRPr lang="th-TH" dirty="0"/>
           </a:p>
         </p:txBody>
       </p:sp>
@@ -15548,6 +15790,121 @@
       </p:par>
     </p:tnLst>
   </p:timing>
+</p:sld>
+</file>
+
+<file path=ppt/slides/slide9.xml><?xml version="1.0" encoding="utf-8"?>
+<p:sld xmlns:a="http://schemas.openxmlformats.org/drawingml/2006/main" xmlns:r="http://schemas.openxmlformats.org/officeDocument/2006/relationships" xmlns:p="http://schemas.openxmlformats.org/presentationml/2006/main">
+  <p:cSld>
+    <p:spTree>
+      <p:nvGrpSpPr>
+        <p:cNvPr id="1" name=""/>
+        <p:cNvGrpSpPr/>
+        <p:nvPr/>
+      </p:nvGrpSpPr>
+      <p:grpSpPr>
+        <a:xfrm>
+          <a:off x="0" y="0"/>
+          <a:ext cx="0" cy="0"/>
+          <a:chOff x="0" y="0"/>
+          <a:chExt cx="0" cy="0"/>
+        </a:xfrm>
+      </p:grpSpPr>
+      <p:sp>
+        <p:nvSpPr>
+          <p:cNvPr id="2" name="Title 1"/>
+          <p:cNvSpPr>
+            <a:spLocks noGrp="1"/>
+          </p:cNvSpPr>
+          <p:nvPr>
+            <p:ph type="title"/>
+          </p:nvPr>
+        </p:nvSpPr>
+        <p:spPr/>
+        <p:txBody>
+          <a:bodyPr>
+            <a:normAutofit/>
+          </a:bodyPr>
+          <a:lstStyle/>
+          <a:p>
+            <a:pPr lvl="1" algn="ctr" rtl="0">
+              <a:lnSpc>
+                <a:spcPct val="90000"/>
+              </a:lnSpc>
+              <a:spcBef>
+                <a:spcPct val="0"/>
+              </a:spcBef>
+            </a:pPr>
+            <a:r>
+              <a:rPr lang="th-TH" sz="4000" dirty="0" smtClean="0">
+                <a:latin typeface="TH Sarabun New" panose="020B0500040200020003" pitchFamily="34" charset="-34"/>
+                <a:cs typeface="TH Sarabun New" panose="020B0500040200020003" pitchFamily="34" charset="-34"/>
+              </a:rPr>
+              <a:t>การออกแบบระบบใหม่ (</a:t>
+            </a:r>
+            <a:r>
+              <a:rPr lang="en-GB" sz="4000" dirty="0" smtClean="0">
+                <a:latin typeface="TH Sarabun New" panose="020B0500040200020003" pitchFamily="34" charset="-34"/>
+                <a:cs typeface="TH Sarabun New" panose="020B0500040200020003" pitchFamily="34" charset="-34"/>
+              </a:rPr>
+              <a:t>System design)</a:t>
+            </a:r>
+            <a:endParaRPr lang="th-TH" sz="3200" dirty="0"/>
+          </a:p>
+        </p:txBody>
+      </p:sp>
+      <p:pic>
+        <p:nvPicPr>
+          <p:cNvPr id="6" name="Content Placeholder 5"/>
+          <p:cNvPicPr>
+            <a:picLocks noGrp="1" noChangeAspect="1"/>
+          </p:cNvPicPr>
+          <p:nvPr>
+            <p:ph sz="quarter" idx="13"/>
+          </p:nvPr>
+        </p:nvPicPr>
+        <p:blipFill>
+          <a:blip r:embed="rId2">
+            <a:extLst>
+              <a:ext uri="{28A0092B-C50C-407E-A947-70E740481C1C}">
+                <a14:useLocalDpi xmlns:a14="http://schemas.microsoft.com/office/drawing/2010/main" val="0"/>
+              </a:ext>
+            </a:extLst>
+          </a:blip>
+          <a:stretch>
+            <a:fillRect/>
+          </a:stretch>
+        </p:blipFill>
+        <p:spPr>
+          <a:xfrm>
+            <a:off x="2464526" y="1741187"/>
+            <a:ext cx="7262948" cy="4838224"/>
+          </a:xfrm>
+          <a:prstGeom prst="rect">
+            <a:avLst/>
+          </a:prstGeom>
+          <a:ln>
+            <a:noFill/>
+          </a:ln>
+          <a:effectLst>
+            <a:outerShdw blurRad="292100" dist="139700" dir="2700000" algn="tl" rotWithShape="0">
+              <a:srgbClr val="333333">
+                <a:alpha val="65000"/>
+              </a:srgbClr>
+            </a:outerShdw>
+          </a:effectLst>
+        </p:spPr>
+      </p:pic>
+    </p:spTree>
+    <p:extLst>
+      <p:ext uri="{BB962C8B-B14F-4D97-AF65-F5344CB8AC3E}">
+        <p14:creationId xmlns:p14="http://schemas.microsoft.com/office/powerpoint/2010/main" val="3134617748"/>
+      </p:ext>
+    </p:extLst>
+  </p:cSld>
+  <p:clrMapOvr>
+    <a:masterClrMapping/>
+  </p:clrMapOvr>
 </p:sld>
 </file>
 

</xml_diff>